<commit_message>
Rivashan added his Sequence Demo
</commit_message>
<xml_diff>
--- a/Documents/biops_presentation.pptx
+++ b/Documents/biops_presentation.pptx
@@ -5,7 +5,7 @@
     <p:sldMasterId id="2147483648" r:id="rId4"/>
   </p:sldMasterIdLst>
   <p:notesMasterIdLst>
-    <p:notesMasterId r:id="rId17"/>
+    <p:notesMasterId r:id="rId18"/>
   </p:notesMasterIdLst>
   <p:sldIdLst>
     <p:sldId id="264" r:id="rId5"/>
@@ -18,8 +18,9 @@
     <p:sldId id="259" r:id="rId12"/>
     <p:sldId id="270" r:id="rId13"/>
     <p:sldId id="260" r:id="rId14"/>
-    <p:sldId id="271" r:id="rId15"/>
-    <p:sldId id="272" r:id="rId16"/>
+    <p:sldId id="277" r:id="rId15"/>
+    <p:sldId id="271" r:id="rId16"/>
+    <p:sldId id="272" r:id="rId17"/>
   </p:sldIdLst>
   <p:sldSz cx="12192000" cy="6858000"/>
   <p:notesSz cx="6858000" cy="9144000"/>
@@ -903,6 +904,96 @@
               <a:rPr lang="en-GB" smtClean="0"/>
               <a:pPr/>
               <a:t>10</a:t>
+            </a:fld>
+            <a:endParaRPr lang="en-GB" sz="800" dirty="0"/>
+          </a:p>
+        </p:txBody>
+      </p:sp>
+    </p:spTree>
+    <p:extLst>
+      <p:ext uri="{BB962C8B-B14F-4D97-AF65-F5344CB8AC3E}">
+        <p14:creationId xmlns:p14="http://schemas.microsoft.com/office/powerpoint/2010/main" val="3557167990"/>
+      </p:ext>
+    </p:extLst>
+  </p:cSld>
+  <p:clrMapOvr>
+    <a:masterClrMapping/>
+  </p:clrMapOvr>
+</p:notes>
+</file>
+
+<file path=ppt/notesSlides/notesSlide6.xml><?xml version="1.0" encoding="utf-8"?>
+<p:notes xmlns:a="http://schemas.openxmlformats.org/drawingml/2006/main" xmlns:r="http://schemas.openxmlformats.org/officeDocument/2006/relationships" xmlns:p="http://schemas.openxmlformats.org/presentationml/2006/main">
+  <p:cSld>
+    <p:spTree>
+      <p:nvGrpSpPr>
+        <p:cNvPr id="1" name=""/>
+        <p:cNvGrpSpPr/>
+        <p:nvPr/>
+      </p:nvGrpSpPr>
+      <p:grpSpPr>
+        <a:xfrm>
+          <a:off x="0" y="0"/>
+          <a:ext cx="0" cy="0"/>
+          <a:chOff x="0" y="0"/>
+          <a:chExt cx="0" cy="0"/>
+        </a:xfrm>
+      </p:grpSpPr>
+      <p:sp>
+        <p:nvSpPr>
+          <p:cNvPr id="2" name="Slide Image Placeholder 1"/>
+          <p:cNvSpPr>
+            <a:spLocks noGrp="1" noRot="1" noChangeAspect="1"/>
+          </p:cNvSpPr>
+          <p:nvPr>
+            <p:ph type="sldImg"/>
+          </p:nvPr>
+        </p:nvSpPr>
+        <p:spPr>
+          <a:xfrm>
+            <a:off x="360363" y="1479550"/>
+            <a:ext cx="6137275" cy="3452813"/>
+          </a:xfrm>
+        </p:spPr>
+      </p:sp>
+      <p:sp>
+        <p:nvSpPr>
+          <p:cNvPr id="3" name="Notes Placeholder 2"/>
+          <p:cNvSpPr>
+            <a:spLocks noGrp="1"/>
+          </p:cNvSpPr>
+          <p:nvPr>
+            <p:ph type="body" idx="1"/>
+          </p:nvPr>
+        </p:nvSpPr>
+        <p:spPr/>
+        <p:txBody>
+          <a:bodyPr/>
+          <a:lstStyle/>
+          <a:p>
+            <a:endParaRPr lang="en-US" dirty="0"/>
+          </a:p>
+        </p:txBody>
+      </p:sp>
+      <p:sp>
+        <p:nvSpPr>
+          <p:cNvPr id="4" name="Slide Number Placeholder 3"/>
+          <p:cNvSpPr>
+            <a:spLocks noGrp="1"/>
+          </p:cNvSpPr>
+          <p:nvPr>
+            <p:ph type="sldNum" sz="quarter" idx="5"/>
+          </p:nvPr>
+        </p:nvSpPr>
+        <p:spPr/>
+        <p:txBody>
+          <a:bodyPr/>
+          <a:lstStyle/>
+          <a:p>
+            <a:fld id="{A16CFAD1-D197-4A88-B173-A6412E995EE5}" type="slidenum">
+              <a:rPr lang="en-GB" smtClean="0"/>
+              <a:pPr/>
+              <a:t>11</a:t>
             </a:fld>
             <a:endParaRPr lang="en-GB" sz="800" dirty="0"/>
           </a:p>
@@ -7100,12 +7191,111 @@
           <a:chExt cx="0" cy="0"/>
         </a:xfrm>
       </p:grpSpPr>
+      <p:sp>
+        <p:nvSpPr>
+          <p:cNvPr id="2" name="Title 1">
+            <a:extLst>
+              <a:ext uri="{FF2B5EF4-FFF2-40B4-BE49-F238E27FC236}">
+                <a16:creationId xmlns:a16="http://schemas.microsoft.com/office/drawing/2014/main" id="{C4D911ED-45A4-21F7-C785-C5476A46B792}"/>
+              </a:ext>
+            </a:extLst>
+          </p:cNvPr>
+          <p:cNvSpPr>
+            <a:spLocks noGrp="1"/>
+          </p:cNvSpPr>
+          <p:nvPr>
+            <p:ph type="title" idx="4294967295"/>
+          </p:nvPr>
+        </p:nvSpPr>
+        <p:spPr>
+          <a:xfrm>
+            <a:off x="162808" y="55755"/>
+            <a:ext cx="11041200" cy="460800"/>
+          </a:xfrm>
+          <a:prstGeom prst="rect">
+            <a:avLst/>
+          </a:prstGeom>
+        </p:spPr>
+        <p:txBody>
+          <a:bodyPr/>
+          <a:lstStyle/>
+          <a:p>
+            <a:r>
+              <a:rPr lang="en-US" dirty="0">
+                <a:solidFill>
+                  <a:schemeClr val="tx1"/>
+                </a:solidFill>
+                <a:latin typeface="Helvetica" panose="020B0604020202020204" pitchFamily="34" charset="0"/>
+                <a:cs typeface="Helvetica" panose="020B0604020202020204" pitchFamily="34" charset="0"/>
+              </a:rPr>
+              <a:t>Sequence of Demo</a:t>
+            </a:r>
+          </a:p>
+        </p:txBody>
+      </p:sp>
+      <p:sp>
+        <p:nvSpPr>
+          <p:cNvPr id="7" name="Title 1">
+            <a:extLst>
+              <a:ext uri="{FF2B5EF4-FFF2-40B4-BE49-F238E27FC236}">
+                <a16:creationId xmlns:a16="http://schemas.microsoft.com/office/drawing/2014/main" id="{8825D293-2320-DF93-A0FB-CE8B5FB3EBD1}"/>
+              </a:ext>
+            </a:extLst>
+          </p:cNvPr>
+          <p:cNvSpPr txBox="1">
+            <a:spLocks/>
+          </p:cNvSpPr>
+          <p:nvPr/>
+        </p:nvSpPr>
+        <p:spPr>
+          <a:xfrm>
+            <a:off x="95199" y="1923481"/>
+            <a:ext cx="11879756" cy="4934519"/>
+          </a:xfrm>
+          <a:prstGeom prst="rect">
+            <a:avLst/>
+          </a:prstGeom>
+        </p:spPr>
+        <p:txBody>
+          <a:bodyPr vert="horz" lIns="0" tIns="0" rIns="0" bIns="0" rtlCol="0" anchor="t" anchorCtr="0">
+            <a:noAutofit/>
+          </a:bodyPr>
+          <a:lstStyle>
+            <a:lvl1pPr algn="l" defTabSz="914400" rtl="0" eaLnBrk="1" latinLnBrk="0" hangingPunct="1">
+              <a:lnSpc>
+                <a:spcPct val="90000"/>
+              </a:lnSpc>
+              <a:spcBef>
+                <a:spcPct val="0"/>
+              </a:spcBef>
+              <a:buNone/>
+              <a:defRPr sz="3200" b="0" kern="1200">
+                <a:solidFill>
+                  <a:schemeClr val="accent1"/>
+                </a:solidFill>
+                <a:latin typeface="+mj-lt"/>
+                <a:ea typeface="+mj-ea"/>
+                <a:cs typeface="+mj-cs"/>
+              </a:defRPr>
+            </a:lvl1pPr>
+          </a:lstStyle>
+          <a:p>
+            <a:endParaRPr lang="en-US" sz="1000" dirty="0">
+              <a:solidFill>
+                <a:schemeClr val="tx1"/>
+              </a:solidFill>
+              <a:latin typeface="+mn-lt"/>
+              <a:cs typeface="Helvetica" panose="020B0604020202020204" pitchFamily="34" charset="0"/>
+            </a:endParaRPr>
+          </a:p>
+        </p:txBody>
+      </p:sp>
       <p:pic>
         <p:nvPicPr>
-          <p:cNvPr id="3" name="Picture 2" descr="A white hexagons with blue edges&#10;&#10;Description automatically generated">
-            <a:extLst>
-              <a:ext uri="{FF2B5EF4-FFF2-40B4-BE49-F238E27FC236}">
-                <a16:creationId xmlns:a16="http://schemas.microsoft.com/office/drawing/2014/main" id="{B2F1C530-16E9-7FB6-B8D3-BB3A8650EEC8}"/>
+          <p:cNvPr id="6" name="Picture 5" descr="A blue logo on a white background&#10;&#10;Description automatically generated">
+            <a:extLst>
+              <a:ext uri="{FF2B5EF4-FFF2-40B4-BE49-F238E27FC236}">
+                <a16:creationId xmlns:a16="http://schemas.microsoft.com/office/drawing/2014/main" id="{0ECA982E-16CF-F736-1E82-5782CD552BC8}"/>
               </a:ext>
             </a:extLst>
           </p:cNvPr>
@@ -7115,11 +7305,10 @@
           <p:nvPr/>
         </p:nvPicPr>
         <p:blipFill>
-          <a:blip r:embed="rId2" cstate="email">
-            <a:alphaModFix amt="35000"/>
+          <a:blip r:embed="rId3">
             <a:extLst>
               <a:ext uri="{28A0092B-C50C-407E-A947-70E740481C1C}">
-                <a14:useLocalDpi xmlns:a14="http://schemas.microsoft.com/office/drawing/2010/main"/>
+                <a14:useLocalDpi xmlns:a14="http://schemas.microsoft.com/office/drawing/2010/main" val="0"/>
               </a:ext>
             </a:extLst>
           </a:blip>
@@ -7129,20 +7318,200 @@
         </p:blipFill>
         <p:spPr>
           <a:xfrm>
-            <a:off x="0" y="0"/>
-            <a:ext cx="12192000" cy="6858000"/>
+            <a:off x="2852987" y="2762083"/>
+            <a:ext cx="1466662" cy="1466662"/>
           </a:xfrm>
           <a:prstGeom prst="rect">
             <a:avLst/>
           </a:prstGeom>
         </p:spPr>
       </p:pic>
+      <p:pic>
+        <p:nvPicPr>
+          <p:cNvPr id="9" name="Picture 8" descr="A computer screen with a yellow circle and a green tick&#10;&#10;Description automatically generated">
+            <a:extLst>
+              <a:ext uri="{FF2B5EF4-FFF2-40B4-BE49-F238E27FC236}">
+                <a16:creationId xmlns:a16="http://schemas.microsoft.com/office/drawing/2014/main" id="{572330BC-74FE-7745-EA4D-15B31AD386C0}"/>
+              </a:ext>
+            </a:extLst>
+          </p:cNvPr>
+          <p:cNvPicPr>
+            <a:picLocks noChangeAspect="1"/>
+          </p:cNvPicPr>
+          <p:nvPr/>
+        </p:nvPicPr>
+        <p:blipFill>
+          <a:blip r:embed="rId4">
+            <a:extLst>
+              <a:ext uri="{28A0092B-C50C-407E-A947-70E740481C1C}">
+                <a14:useLocalDpi xmlns:a14="http://schemas.microsoft.com/office/drawing/2010/main" val="0"/>
+              </a:ext>
+            </a:extLst>
+          </a:blip>
+          <a:stretch>
+            <a:fillRect/>
+          </a:stretch>
+        </p:blipFill>
+        <p:spPr>
+          <a:xfrm>
+            <a:off x="217045" y="2682415"/>
+            <a:ext cx="1590675" cy="1781175"/>
+          </a:xfrm>
+          <a:prstGeom prst="rect">
+            <a:avLst/>
+          </a:prstGeom>
+        </p:spPr>
+      </p:pic>
+      <p:pic>
+        <p:nvPicPr>
+          <p:cNvPr id="13" name="Picture 12">
+            <a:extLst>
+              <a:ext uri="{FF2B5EF4-FFF2-40B4-BE49-F238E27FC236}">
+                <a16:creationId xmlns:a16="http://schemas.microsoft.com/office/drawing/2014/main" id="{7799F3B1-C832-0129-9A46-894DAE2DEA05}"/>
+              </a:ext>
+            </a:extLst>
+          </p:cNvPr>
+          <p:cNvPicPr>
+            <a:picLocks noChangeAspect="1"/>
+          </p:cNvPicPr>
+          <p:nvPr/>
+        </p:nvPicPr>
+        <p:blipFill>
+          <a:blip r:embed="rId5">
+            <a:extLst>
+              <a:ext uri="{28A0092B-C50C-407E-A947-70E740481C1C}">
+                <a14:useLocalDpi xmlns:a14="http://schemas.microsoft.com/office/drawing/2010/main" val="0"/>
+              </a:ext>
+            </a:extLst>
+          </a:blip>
+          <a:stretch>
+            <a:fillRect/>
+          </a:stretch>
+        </p:blipFill>
+        <p:spPr>
+          <a:xfrm>
+            <a:off x="5509963" y="2734878"/>
+            <a:ext cx="2987207" cy="1676250"/>
+          </a:xfrm>
+          <a:prstGeom prst="rect">
+            <a:avLst/>
+          </a:prstGeom>
+        </p:spPr>
+      </p:pic>
+      <p:pic>
+        <p:nvPicPr>
+          <p:cNvPr id="19" name="Picture 18" descr="A logo of a company&#10;&#10;Description automatically generated">
+            <a:extLst>
+              <a:ext uri="{FF2B5EF4-FFF2-40B4-BE49-F238E27FC236}">
+                <a16:creationId xmlns:a16="http://schemas.microsoft.com/office/drawing/2014/main" id="{8D678859-A853-2FAB-1F04-66F46FB7B984}"/>
+              </a:ext>
+            </a:extLst>
+          </p:cNvPr>
+          <p:cNvPicPr>
+            <a:picLocks noChangeAspect="1"/>
+          </p:cNvPicPr>
+          <p:nvPr/>
+        </p:nvPicPr>
+        <p:blipFill>
+          <a:blip r:embed="rId6">
+            <a:extLst>
+              <a:ext uri="{28A0092B-C50C-407E-A947-70E740481C1C}">
+                <a14:useLocalDpi xmlns:a14="http://schemas.microsoft.com/office/drawing/2010/main" val="0"/>
+              </a:ext>
+            </a:extLst>
+          </a:blip>
+          <a:stretch>
+            <a:fillRect/>
+          </a:stretch>
+        </p:blipFill>
+        <p:spPr>
+          <a:xfrm>
+            <a:off x="10077201" y="2579700"/>
+            <a:ext cx="1831428" cy="1831428"/>
+          </a:xfrm>
+          <a:prstGeom prst="rect">
+            <a:avLst/>
+          </a:prstGeom>
+        </p:spPr>
+      </p:pic>
+      <p:pic>
+        <p:nvPicPr>
+          <p:cNvPr id="21" name="Picture 20" descr="A blue and green logo&#10;&#10;Description automatically generated">
+            <a:extLst>
+              <a:ext uri="{FF2B5EF4-FFF2-40B4-BE49-F238E27FC236}">
+                <a16:creationId xmlns:a16="http://schemas.microsoft.com/office/drawing/2014/main" id="{F94087DA-7C4A-67B7-85F5-5EBE78D29108}"/>
+              </a:ext>
+            </a:extLst>
+          </p:cNvPr>
+          <p:cNvPicPr>
+            <a:picLocks noChangeAspect="1"/>
+          </p:cNvPicPr>
+          <p:nvPr/>
+        </p:nvPicPr>
+        <p:blipFill>
+          <a:blip r:embed="rId7">
+            <a:extLst>
+              <a:ext uri="{28A0092B-C50C-407E-A947-70E740481C1C}">
+                <a14:useLocalDpi xmlns:a14="http://schemas.microsoft.com/office/drawing/2010/main" val="0"/>
+              </a:ext>
+            </a:extLst>
+          </a:blip>
+          <a:stretch>
+            <a:fillRect/>
+          </a:stretch>
+        </p:blipFill>
+        <p:spPr>
+          <a:xfrm>
+            <a:off x="9687484" y="2203108"/>
+            <a:ext cx="889195" cy="632442"/>
+          </a:xfrm>
+          <a:prstGeom prst="rect">
+            <a:avLst/>
+          </a:prstGeom>
+        </p:spPr>
+      </p:pic>
+      <p:pic>
+        <p:nvPicPr>
+          <p:cNvPr id="25" name="Picture 24" descr="A yellow rectangular shapes on a black background&#10;&#10;Description automatically generated">
+            <a:extLst>
+              <a:ext uri="{FF2B5EF4-FFF2-40B4-BE49-F238E27FC236}">
+                <a16:creationId xmlns:a16="http://schemas.microsoft.com/office/drawing/2014/main" id="{F63E02D8-29C2-051E-0DD8-F47D0EAF4682}"/>
+              </a:ext>
+            </a:extLst>
+          </p:cNvPr>
+          <p:cNvPicPr>
+            <a:picLocks noChangeAspect="1"/>
+          </p:cNvPicPr>
+          <p:nvPr/>
+        </p:nvPicPr>
+        <p:blipFill>
+          <a:blip r:embed="rId8">
+            <a:extLst>
+              <a:ext uri="{28A0092B-C50C-407E-A947-70E740481C1C}">
+                <a14:useLocalDpi xmlns:a14="http://schemas.microsoft.com/office/drawing/2010/main" val="0"/>
+              </a:ext>
+            </a:extLst>
+          </a:blip>
+          <a:stretch>
+            <a:fillRect/>
+          </a:stretch>
+        </p:blipFill>
+        <p:spPr>
+          <a:xfrm>
+            <a:off x="10643417" y="3858654"/>
+            <a:ext cx="1891862" cy="1064172"/>
+          </a:xfrm>
+          <a:prstGeom prst="rect">
+            <a:avLst/>
+          </a:prstGeom>
+        </p:spPr>
+      </p:pic>
       <p:sp>
         <p:nvSpPr>
-          <p:cNvPr id="21" name="Isosceles Triangle 20">
-            <a:extLst>
-              <a:ext uri="{FF2B5EF4-FFF2-40B4-BE49-F238E27FC236}">
-                <a16:creationId xmlns:a16="http://schemas.microsoft.com/office/drawing/2014/main" id="{27015457-004D-ED7D-3B53-4C917E9BF5CA}"/>
+          <p:cNvPr id="26" name="Arrow: Right 25">
+            <a:extLst>
+              <a:ext uri="{FF2B5EF4-FFF2-40B4-BE49-F238E27FC236}">
+                <a16:creationId xmlns:a16="http://schemas.microsoft.com/office/drawing/2014/main" id="{967522E5-196D-01E4-69C6-81438EFC0AB5}"/>
               </a:ext>
             </a:extLst>
           </p:cNvPr>
@@ -7151,20 +7520,26 @@
         </p:nvSpPr>
         <p:spPr>
           <a:xfrm>
-            <a:off x="0" y="0"/>
-            <a:ext cx="9615377" cy="6858000"/>
-          </a:xfrm>
-          <a:prstGeom prst="triangle">
-            <a:avLst>
-              <a:gd name="adj" fmla="val 0"/>
-            </a:avLst>
+            <a:off x="1816366" y="3316738"/>
+            <a:ext cx="882928" cy="357352"/>
+          </a:xfrm>
+          <a:prstGeom prst="rightArrow">
+            <a:avLst/>
           </a:prstGeom>
-          <a:solidFill>
-            <a:srgbClr val="0056AE"/>
-          </a:solidFill>
+          <a:gradFill>
+            <a:gsLst>
+              <a:gs pos="57000">
+                <a:srgbClr val="A4C8E0"/>
+              </a:gs>
+              <a:gs pos="100000">
+                <a:srgbClr val="0070C0"/>
+              </a:gs>
+            </a:gsLst>
+            <a:lin ang="18900000" scaled="1"/>
+          </a:gradFill>
           <a:ln>
             <a:solidFill>
-              <a:srgbClr val="0056AE"/>
+              <a:schemeClr val="accent1"/>
             </a:solidFill>
           </a:ln>
         </p:spPr>
@@ -7195,125 +7570,134 @@
       </p:sp>
       <p:sp>
         <p:nvSpPr>
-          <p:cNvPr id="2" name="Slide Number Placeholder 1">
-            <a:extLst>
-              <a:ext uri="{FF2B5EF4-FFF2-40B4-BE49-F238E27FC236}">
-                <a16:creationId xmlns:a16="http://schemas.microsoft.com/office/drawing/2014/main" id="{759C60B5-1358-D026-FF38-8DBBACD47019}"/>
-              </a:ext>
-            </a:extLst>
-          </p:cNvPr>
-          <p:cNvSpPr>
-            <a:spLocks noGrp="1"/>
-          </p:cNvSpPr>
-          <p:nvPr>
-            <p:ph type="sldNum" sz="quarter" idx="17"/>
-          </p:nvPr>
+          <p:cNvPr id="27" name="Arrow: Right 26">
+            <a:extLst>
+              <a:ext uri="{FF2B5EF4-FFF2-40B4-BE49-F238E27FC236}">
+                <a16:creationId xmlns:a16="http://schemas.microsoft.com/office/drawing/2014/main" id="{8B3DE9B2-E66E-25E2-8022-5AA0C02D9767}"/>
+              </a:ext>
+            </a:extLst>
+          </p:cNvPr>
+          <p:cNvSpPr/>
+          <p:nvPr/>
         </p:nvSpPr>
-        <p:spPr/>
+        <p:spPr>
+          <a:xfrm>
+            <a:off x="4423210" y="3315708"/>
+            <a:ext cx="882928" cy="357352"/>
+          </a:xfrm>
+          <a:prstGeom prst="rightArrow">
+            <a:avLst/>
+          </a:prstGeom>
+          <a:gradFill>
+            <a:gsLst>
+              <a:gs pos="57000">
+                <a:srgbClr val="A4C8E0"/>
+              </a:gs>
+              <a:gs pos="100000">
+                <a:srgbClr val="0070C0"/>
+              </a:gs>
+            </a:gsLst>
+            <a:lin ang="18900000" scaled="1"/>
+          </a:gradFill>
+          <a:ln>
+            <a:solidFill>
+              <a:schemeClr val="accent1"/>
+            </a:solidFill>
+          </a:ln>
+        </p:spPr>
+        <p:style>
+          <a:lnRef idx="2">
+            <a:schemeClr val="accent1">
+              <a:shade val="50000"/>
+            </a:schemeClr>
+          </a:lnRef>
+          <a:fillRef idx="1">
+            <a:schemeClr val="accent1"/>
+          </a:fillRef>
+          <a:effectRef idx="0">
+            <a:schemeClr val="accent1"/>
+          </a:effectRef>
+          <a:fontRef idx="minor">
+            <a:schemeClr val="lt1"/>
+          </a:fontRef>
+        </p:style>
         <p:txBody>
-          <a:bodyPr/>
+          <a:bodyPr lIns="72000" tIns="36000" rIns="72000" bIns="36000" rtlCol="0" anchor="ctr"/>
           <a:lstStyle/>
           <a:p>
-            <a:fld id="{23AA811B-2EBD-4900-905E-5BE206449611}" type="slidenum">
-              <a:rPr lang="en-GB" smtClean="0"/>
-              <a:pPr/>
-              <a:t>11</a:t>
-            </a:fld>
-            <a:endParaRPr lang="en-GB" dirty="0"/>
+            <a:pPr algn="ctr"/>
+            <a:endParaRPr lang="en-ZA" sz="1400" dirty="0" err="1"/>
           </a:p>
         </p:txBody>
       </p:sp>
       <p:sp>
         <p:nvSpPr>
-          <p:cNvPr id="9" name="Text Placeholder 9">
-            <a:extLst>
-              <a:ext uri="{FF2B5EF4-FFF2-40B4-BE49-F238E27FC236}">
-                <a16:creationId xmlns:a16="http://schemas.microsoft.com/office/drawing/2014/main" id="{302E7C59-D305-5F46-C4DF-DEF02469E3CC}"/>
-              </a:ext>
-            </a:extLst>
-          </p:cNvPr>
-          <p:cNvSpPr>
-            <a:spLocks noGrp="1"/>
-          </p:cNvSpPr>
-          <p:nvPr>
-            <p:ph type="body" sz="quarter" idx="19"/>
-          </p:nvPr>
-        </p:nvSpPr>
-        <p:spPr>
-          <a:xfrm>
-            <a:off x="460865" y="6420548"/>
-            <a:ext cx="6312900" cy="244800"/>
-          </a:xfrm>
-        </p:spPr>
-        <p:txBody>
-          <a:bodyPr/>
-          <a:lstStyle/>
-          <a:p>
-            <a:r>
-              <a:rPr lang="en-ZA" dirty="0">
-                <a:latin typeface="Helvetica" panose="020B0604020202020204" pitchFamily="34" charset="0"/>
-                <a:cs typeface="Helvetica" panose="020B0604020202020204" pitchFamily="34" charset="0"/>
-              </a:rPr>
-              <a:t>Data Led: Intelligent Insights</a:t>
-            </a:r>
-          </a:p>
-        </p:txBody>
-      </p:sp>
-      <p:sp>
-        <p:nvSpPr>
-          <p:cNvPr id="7" name="TextBox 6">
-            <a:extLst>
-              <a:ext uri="{FF2B5EF4-FFF2-40B4-BE49-F238E27FC236}">
-                <a16:creationId xmlns:a16="http://schemas.microsoft.com/office/drawing/2014/main" id="{5DA691A9-2FC5-5070-CAD2-884AD82BEF6F}"/>
-              </a:ext>
-            </a:extLst>
-          </p:cNvPr>
-          <p:cNvSpPr txBox="1"/>
+          <p:cNvPr id="28" name="Arrow: Right 27">
+            <a:extLst>
+              <a:ext uri="{FF2B5EF4-FFF2-40B4-BE49-F238E27FC236}">
+                <a16:creationId xmlns:a16="http://schemas.microsoft.com/office/drawing/2014/main" id="{1B62F318-7FC4-CFA5-B661-1E8E17D9E340}"/>
+              </a:ext>
+            </a:extLst>
+          </p:cNvPr>
+          <p:cNvSpPr/>
           <p:nvPr/>
         </p:nvSpPr>
         <p:spPr>
           <a:xfrm>
-            <a:off x="460865" y="4981897"/>
-            <a:ext cx="7470784" cy="553998"/>
-          </a:xfrm>
-          <a:prstGeom prst="rect">
+            <a:off x="8897549" y="3315708"/>
+            <a:ext cx="882928" cy="357352"/>
+          </a:xfrm>
+          <a:prstGeom prst="rightArrow">
             <a:avLst/>
           </a:prstGeom>
-          <a:noFill/>
-        </p:spPr>
+          <a:gradFill>
+            <a:gsLst>
+              <a:gs pos="57000">
+                <a:srgbClr val="A4C8E0"/>
+              </a:gs>
+              <a:gs pos="100000">
+                <a:srgbClr val="0070C0"/>
+              </a:gs>
+            </a:gsLst>
+            <a:lin ang="18900000" scaled="1"/>
+          </a:gradFill>
+          <a:ln>
+            <a:solidFill>
+              <a:schemeClr val="accent1"/>
+            </a:solidFill>
+          </a:ln>
+        </p:spPr>
+        <p:style>
+          <a:lnRef idx="2">
+            <a:schemeClr val="accent1">
+              <a:shade val="50000"/>
+            </a:schemeClr>
+          </a:lnRef>
+          <a:fillRef idx="1">
+            <a:schemeClr val="accent1"/>
+          </a:fillRef>
+          <a:effectRef idx="0">
+            <a:schemeClr val="accent1"/>
+          </a:effectRef>
+          <a:fontRef idx="minor">
+            <a:schemeClr val="lt1"/>
+          </a:fontRef>
+        </p:style>
         <p:txBody>
-          <a:bodyPr wrap="square" lIns="0" tIns="0" rIns="0" bIns="0" rtlCol="0">
-            <a:spAutoFit/>
-          </a:bodyPr>
+          <a:bodyPr lIns="72000" tIns="36000" rIns="72000" bIns="36000" rtlCol="0" anchor="ctr"/>
           <a:lstStyle/>
           <a:p>
-            <a:pPr algn="l">
-              <a:spcAft>
-                <a:spcPts val="600"/>
-              </a:spcAft>
-            </a:pPr>
-            <a:r>
-              <a:rPr lang="en-US" sz="3600" dirty="0">
-                <a:solidFill>
-                  <a:schemeClr val="bg1"/>
-                </a:solidFill>
-              </a:rPr>
-              <a:t>BIOps Demo</a:t>
-            </a:r>
-            <a:endParaRPr lang="en-ZA" sz="3600" dirty="0">
-              <a:solidFill>
-                <a:schemeClr val="bg1"/>
-              </a:solidFill>
-            </a:endParaRPr>
+            <a:pPr algn="ctr"/>
+            <a:endParaRPr lang="en-ZA" sz="1400" dirty="0" err="1"/>
           </a:p>
         </p:txBody>
       </p:sp>
       <p:pic>
         <p:nvPicPr>
-          <p:cNvPr id="5" name="Picture 4" descr="A logo on a black background&#10;&#10;Description automatically generated">
-            <a:extLst>
-              <a:ext uri="{FF2B5EF4-FFF2-40B4-BE49-F238E27FC236}">
-                <a16:creationId xmlns:a16="http://schemas.microsoft.com/office/drawing/2014/main" id="{9F3E140F-F3D0-01D6-801E-82611693B129}"/>
+          <p:cNvPr id="30" name="Picture 29" descr="A black and white symbol&#10;&#10;Description automatically generated">
+            <a:extLst>
+              <a:ext uri="{FF2B5EF4-FFF2-40B4-BE49-F238E27FC236}">
+                <a16:creationId xmlns:a16="http://schemas.microsoft.com/office/drawing/2014/main" id="{20870E54-E4C7-64D3-5CF9-B57DEFD0A45E}"/>
               </a:ext>
             </a:extLst>
           </p:cNvPr>
@@ -7322,86 +7706,488 @@
           </p:cNvPicPr>
           <p:nvPr/>
         </p:nvPicPr>
-        <p:blipFill rotWithShape="1">
-          <a:blip r:embed="rId3" cstate="email">
-            <a:extLst>
+        <p:blipFill>
+          <a:blip r:embed="rId9">
+            <a:extLst>
+              <a:ext uri="{BEBA8EAE-BF5A-486C-A8C5-ECC9F3942E4B}">
+                <a14:imgProps xmlns:a14="http://schemas.microsoft.com/office/drawing/2010/main">
+                  <a14:imgLayer r:embed="rId10">
+                    <a14:imgEffect>
+                      <a14:brightnessContrast bright="40000" contrast="40000"/>
+                    </a14:imgEffect>
+                  </a14:imgLayer>
+                </a14:imgProps>
+              </a:ext>
               <a:ext uri="{28A0092B-C50C-407E-A947-70E740481C1C}">
-                <a14:useLocalDpi xmlns:a14="http://schemas.microsoft.com/office/drawing/2010/main"/>
+                <a14:useLocalDpi xmlns:a14="http://schemas.microsoft.com/office/drawing/2010/main" val="0"/>
               </a:ext>
             </a:extLst>
           </a:blip>
-          <a:srcRect/>
-          <a:stretch/>
+          <a:stretch>
+            <a:fillRect/>
+          </a:stretch>
         </p:blipFill>
         <p:spPr>
           <a:xfrm>
-            <a:off x="9409427" y="5820717"/>
-            <a:ext cx="2321708" cy="722231"/>
+            <a:off x="5508366" y="2734878"/>
+            <a:ext cx="667135" cy="667135"/>
           </a:xfrm>
           <a:prstGeom prst="rect">
             <a:avLst/>
           </a:prstGeom>
         </p:spPr>
       </p:pic>
-      <p:sp>
-        <p:nvSpPr>
-          <p:cNvPr id="4" name="TextBox 3">
-            <a:extLst>
-              <a:ext uri="{FF2B5EF4-FFF2-40B4-BE49-F238E27FC236}">
-                <a16:creationId xmlns:a16="http://schemas.microsoft.com/office/drawing/2014/main" id="{79E86465-4476-47FD-A061-C5452DCA3B73}"/>
-              </a:ext>
-            </a:extLst>
-          </p:cNvPr>
-          <p:cNvSpPr txBox="1"/>
+      <p:pic>
+        <p:nvPicPr>
+          <p:cNvPr id="32" name="Picture 31">
+            <a:extLst>
+              <a:ext uri="{FF2B5EF4-FFF2-40B4-BE49-F238E27FC236}">
+                <a16:creationId xmlns:a16="http://schemas.microsoft.com/office/drawing/2014/main" id="{FF2263DD-C994-6957-43AB-0C96DB50C6FC}"/>
+              </a:ext>
+            </a:extLst>
+          </p:cNvPr>
+          <p:cNvPicPr>
+            <a:picLocks noChangeAspect="1"/>
+          </p:cNvPicPr>
           <p:nvPr/>
-        </p:nvSpPr>
+        </p:nvPicPr>
+        <p:blipFill>
+          <a:blip r:embed="rId11">
+            <a:extLst>
+              <a:ext uri="{BEBA8EAE-BF5A-486C-A8C5-ECC9F3942E4B}">
+                <a14:imgProps xmlns:a14="http://schemas.microsoft.com/office/drawing/2010/main">
+                  <a14:imgLayer r:embed="rId12">
+                    <a14:imgEffect>
+                      <a14:brightnessContrast bright="40000" contrast="40000"/>
+                    </a14:imgEffect>
+                  </a14:imgLayer>
+                </a14:imgProps>
+              </a:ext>
+              <a:ext uri="{28A0092B-C50C-407E-A947-70E740481C1C}">
+                <a14:useLocalDpi xmlns:a14="http://schemas.microsoft.com/office/drawing/2010/main" val="0"/>
+              </a:ext>
+            </a:extLst>
+          </a:blip>
+          <a:stretch>
+            <a:fillRect/>
+          </a:stretch>
+        </p:blipFill>
         <p:spPr>
           <a:xfrm>
-            <a:off x="460865" y="5535895"/>
-            <a:ext cx="6731045" cy="430887"/>
+            <a:off x="7830034" y="2731702"/>
+            <a:ext cx="667136" cy="667136"/>
           </a:xfrm>
           <a:prstGeom prst="rect">
             <a:avLst/>
           </a:prstGeom>
-          <a:noFill/>
-        </p:spPr>
-        <p:txBody>
-          <a:bodyPr wrap="square" lIns="0" tIns="0" rIns="0" bIns="0" rtlCol="0">
-            <a:spAutoFit/>
-          </a:bodyPr>
-          <a:lstStyle/>
-          <a:p>
-            <a:pPr algn="l">
-              <a:spcAft>
-                <a:spcPts val="600"/>
-              </a:spcAft>
-            </a:pPr>
-            <a:r>
-              <a:rPr lang="en-US" sz="2800" dirty="0">
-                <a:solidFill>
-                  <a:schemeClr val="bg1"/>
-                </a:solidFill>
-              </a:rPr>
-              <a:t>By Chosen Ones Graduate Team</a:t>
-            </a:r>
-            <a:endParaRPr lang="en-ZA" sz="2800" dirty="0" err="1">
-              <a:solidFill>
-                <a:schemeClr val="bg1"/>
-              </a:solidFill>
-            </a:endParaRPr>
-          </a:p>
-        </p:txBody>
-      </p:sp>
+        </p:spPr>
+      </p:pic>
     </p:spTree>
     <p:extLst>
       <p:ext uri="{BB962C8B-B14F-4D97-AF65-F5344CB8AC3E}">
-        <p14:creationId xmlns:p14="http://schemas.microsoft.com/office/powerpoint/2010/main" val="878242559"/>
+        <p14:creationId xmlns:p14="http://schemas.microsoft.com/office/powerpoint/2010/main" val="1686034521"/>
       </p:ext>
     </p:extLst>
   </p:cSld>
   <p:clrMapOvr>
     <a:masterClrMapping/>
   </p:clrMapOvr>
+  <p:timing>
+    <p:tnLst>
+      <p:par>
+        <p:cTn id="1" dur="indefinite" restart="never" nodeType="tmRoot">
+          <p:childTnLst>
+            <p:seq concurrent="1" nextAc="seek">
+              <p:cTn id="2" restart="whenNotActive" fill="hold" evtFilter="cancelBubble" nodeType="interactiveSeq">
+                <p:stCondLst>
+                  <p:cond evt="onClick" delay="0">
+                    <p:tgtEl>
+                      <p:spTgt spid="6"/>
+                    </p:tgtEl>
+                  </p:cond>
+                </p:stCondLst>
+                <p:endSync evt="end" delay="0">
+                  <p:rtn val="all"/>
+                </p:endSync>
+                <p:childTnLst>
+                  <p:par>
+                    <p:cTn id="3" fill="hold">
+                      <p:stCondLst>
+                        <p:cond delay="0"/>
+                      </p:stCondLst>
+                      <p:childTnLst>
+                        <p:par>
+                          <p:cTn id="4" fill="hold">
+                            <p:stCondLst>
+                              <p:cond delay="0"/>
+                            </p:stCondLst>
+                            <p:childTnLst>
+                              <p:par>
+                                <p:cTn id="5" presetID="10" presetClass="entr" presetSubtype="0" fill="hold" grpId="0" nodeType="clickEffect">
+                                  <p:stCondLst>
+                                    <p:cond delay="0"/>
+                                  </p:stCondLst>
+                                  <p:childTnLst>
+                                    <p:set>
+                                      <p:cBhvr>
+                                        <p:cTn id="6" dur="1" fill="hold">
+                                          <p:stCondLst>
+                                            <p:cond delay="0"/>
+                                          </p:stCondLst>
+                                        </p:cTn>
+                                        <p:tgtEl>
+                                          <p:spTgt spid="26"/>
+                                        </p:tgtEl>
+                                        <p:attrNameLst>
+                                          <p:attrName>style.visibility</p:attrName>
+                                        </p:attrNameLst>
+                                      </p:cBhvr>
+                                      <p:to>
+                                        <p:strVal val="visible"/>
+                                      </p:to>
+                                    </p:set>
+                                    <p:animEffect transition="in" filter="fade">
+                                      <p:cBhvr>
+                                        <p:cTn id="7" dur="1250"/>
+                                        <p:tgtEl>
+                                          <p:spTgt spid="26"/>
+                                        </p:tgtEl>
+                                      </p:cBhvr>
+                                    </p:animEffect>
+                                  </p:childTnLst>
+                                </p:cTn>
+                              </p:par>
+                              <p:par>
+                                <p:cTn id="8" presetID="1" presetClass="emph" presetSubtype="2" fill="hold" nodeType="withEffect">
+                                  <p:stCondLst>
+                                    <p:cond delay="400"/>
+                                  </p:stCondLst>
+                                  <p:childTnLst>
+                                    <p:animClr clrSpc="rgb" dir="cw">
+                                      <p:cBhvr>
+                                        <p:cTn id="9" dur="2000" fill="hold"/>
+                                        <p:tgtEl>
+                                          <p:spTgt spid="26"/>
+                                        </p:tgtEl>
+                                        <p:attrNameLst>
+                                          <p:attrName>fillcolor</p:attrName>
+                                        </p:attrNameLst>
+                                      </p:cBhvr>
+                                      <p:to>
+                                        <a:srgbClr val="002060"/>
+                                      </p:to>
+                                    </p:animClr>
+                                    <p:set>
+                                      <p:cBhvr>
+                                        <p:cTn id="10" dur="2000" fill="hold"/>
+                                        <p:tgtEl>
+                                          <p:spTgt spid="26"/>
+                                        </p:tgtEl>
+                                        <p:attrNameLst>
+                                          <p:attrName>fill.type</p:attrName>
+                                        </p:attrNameLst>
+                                      </p:cBhvr>
+                                      <p:to>
+                                        <p:strVal val="solid"/>
+                                      </p:to>
+                                    </p:set>
+                                    <p:set>
+                                      <p:cBhvr>
+                                        <p:cTn id="11" dur="2000" fill="hold"/>
+                                        <p:tgtEl>
+                                          <p:spTgt spid="26"/>
+                                        </p:tgtEl>
+                                        <p:attrNameLst>
+                                          <p:attrName>fill.on</p:attrName>
+                                        </p:attrNameLst>
+                                      </p:cBhvr>
+                                      <p:to>
+                                        <p:strVal val="true"/>
+                                      </p:to>
+                                    </p:set>
+                                  </p:childTnLst>
+                                </p:cTn>
+                              </p:par>
+                            </p:childTnLst>
+                          </p:cTn>
+                        </p:par>
+                      </p:childTnLst>
+                    </p:cTn>
+                  </p:par>
+                </p:childTnLst>
+              </p:cTn>
+              <p:nextCondLst>
+                <p:cond evt="onClick" delay="0">
+                  <p:tgtEl>
+                    <p:spTgt spid="6"/>
+                  </p:tgtEl>
+                </p:cond>
+              </p:nextCondLst>
+            </p:seq>
+            <p:seq concurrent="1" nextAc="seek">
+              <p:cTn id="12" restart="whenNotActive" fill="hold" evtFilter="cancelBubble" nodeType="interactiveSeq">
+                <p:stCondLst>
+                  <p:cond evt="onClick" delay="0">
+                    <p:tgtEl>
+                      <p:spTgt spid="13"/>
+                    </p:tgtEl>
+                  </p:cond>
+                </p:stCondLst>
+                <p:endSync evt="end" delay="0">
+                  <p:rtn val="all"/>
+                </p:endSync>
+                <p:childTnLst>
+                  <p:par>
+                    <p:cTn id="13" fill="hold">
+                      <p:stCondLst>
+                        <p:cond delay="0"/>
+                      </p:stCondLst>
+                      <p:childTnLst>
+                        <p:par>
+                          <p:cTn id="14" fill="hold">
+                            <p:stCondLst>
+                              <p:cond delay="0"/>
+                            </p:stCondLst>
+                            <p:childTnLst>
+                              <p:par>
+                                <p:cTn id="15" presetID="10" presetClass="entr" presetSubtype="0" fill="hold" grpId="0" nodeType="clickEffect">
+                                  <p:stCondLst>
+                                    <p:cond delay="0"/>
+                                  </p:stCondLst>
+                                  <p:childTnLst>
+                                    <p:set>
+                                      <p:cBhvr>
+                                        <p:cTn id="16" dur="1" fill="hold">
+                                          <p:stCondLst>
+                                            <p:cond delay="0"/>
+                                          </p:stCondLst>
+                                        </p:cTn>
+                                        <p:tgtEl>
+                                          <p:spTgt spid="27"/>
+                                        </p:tgtEl>
+                                        <p:attrNameLst>
+                                          <p:attrName>style.visibility</p:attrName>
+                                        </p:attrNameLst>
+                                      </p:cBhvr>
+                                      <p:to>
+                                        <p:strVal val="visible"/>
+                                      </p:to>
+                                    </p:set>
+                                    <p:animEffect transition="in" filter="fade">
+                                      <p:cBhvr>
+                                        <p:cTn id="17" dur="1250"/>
+                                        <p:tgtEl>
+                                          <p:spTgt spid="27"/>
+                                        </p:tgtEl>
+                                      </p:cBhvr>
+                                    </p:animEffect>
+                                  </p:childTnLst>
+                                </p:cTn>
+                              </p:par>
+                              <p:par>
+                                <p:cTn id="18" presetID="1" presetClass="emph" presetSubtype="2" fill="hold" nodeType="withEffect">
+                                  <p:stCondLst>
+                                    <p:cond delay="400"/>
+                                  </p:stCondLst>
+                                  <p:childTnLst>
+                                    <p:animClr clrSpc="rgb" dir="cw">
+                                      <p:cBhvr>
+                                        <p:cTn id="19" dur="2000" fill="hold"/>
+                                        <p:tgtEl>
+                                          <p:spTgt spid="27"/>
+                                        </p:tgtEl>
+                                        <p:attrNameLst>
+                                          <p:attrName>fillcolor</p:attrName>
+                                        </p:attrNameLst>
+                                      </p:cBhvr>
+                                      <p:to>
+                                        <a:srgbClr val="002060"/>
+                                      </p:to>
+                                    </p:animClr>
+                                    <p:set>
+                                      <p:cBhvr>
+                                        <p:cTn id="20" dur="2000" fill="hold"/>
+                                        <p:tgtEl>
+                                          <p:spTgt spid="27"/>
+                                        </p:tgtEl>
+                                        <p:attrNameLst>
+                                          <p:attrName>fill.type</p:attrName>
+                                        </p:attrNameLst>
+                                      </p:cBhvr>
+                                      <p:to>
+                                        <p:strVal val="solid"/>
+                                      </p:to>
+                                    </p:set>
+                                    <p:set>
+                                      <p:cBhvr>
+                                        <p:cTn id="21" dur="2000" fill="hold"/>
+                                        <p:tgtEl>
+                                          <p:spTgt spid="27"/>
+                                        </p:tgtEl>
+                                        <p:attrNameLst>
+                                          <p:attrName>fill.on</p:attrName>
+                                        </p:attrNameLst>
+                                      </p:cBhvr>
+                                      <p:to>
+                                        <p:strVal val="true"/>
+                                      </p:to>
+                                    </p:set>
+                                  </p:childTnLst>
+                                </p:cTn>
+                              </p:par>
+                            </p:childTnLst>
+                          </p:cTn>
+                        </p:par>
+                      </p:childTnLst>
+                    </p:cTn>
+                  </p:par>
+                </p:childTnLst>
+              </p:cTn>
+              <p:nextCondLst>
+                <p:cond evt="onClick" delay="0">
+                  <p:tgtEl>
+                    <p:spTgt spid="13"/>
+                  </p:tgtEl>
+                </p:cond>
+              </p:nextCondLst>
+            </p:seq>
+            <p:seq concurrent="1" nextAc="seek">
+              <p:cTn id="22" restart="whenNotActive" fill="hold" evtFilter="cancelBubble" nodeType="interactiveSeq">
+                <p:stCondLst>
+                  <p:cond evt="onClick" delay="0">
+                    <p:tgtEl>
+                      <p:spTgt spid="19"/>
+                    </p:tgtEl>
+                  </p:cond>
+                </p:stCondLst>
+                <p:endSync evt="end" delay="0">
+                  <p:rtn val="all"/>
+                </p:endSync>
+                <p:childTnLst>
+                  <p:par>
+                    <p:cTn id="23" fill="hold">
+                      <p:stCondLst>
+                        <p:cond delay="0"/>
+                      </p:stCondLst>
+                      <p:childTnLst>
+                        <p:par>
+                          <p:cTn id="24" fill="hold">
+                            <p:stCondLst>
+                              <p:cond delay="0"/>
+                            </p:stCondLst>
+                            <p:childTnLst>
+                              <p:par>
+                                <p:cTn id="25" presetID="10" presetClass="entr" presetSubtype="0" fill="hold" grpId="0" nodeType="clickEffect">
+                                  <p:stCondLst>
+                                    <p:cond delay="0"/>
+                                  </p:stCondLst>
+                                  <p:childTnLst>
+                                    <p:set>
+                                      <p:cBhvr>
+                                        <p:cTn id="26" dur="1" fill="hold">
+                                          <p:stCondLst>
+                                            <p:cond delay="0"/>
+                                          </p:stCondLst>
+                                        </p:cTn>
+                                        <p:tgtEl>
+                                          <p:spTgt spid="28"/>
+                                        </p:tgtEl>
+                                        <p:attrNameLst>
+                                          <p:attrName>style.visibility</p:attrName>
+                                        </p:attrNameLst>
+                                      </p:cBhvr>
+                                      <p:to>
+                                        <p:strVal val="visible"/>
+                                      </p:to>
+                                    </p:set>
+                                    <p:animEffect transition="in" filter="fade">
+                                      <p:cBhvr>
+                                        <p:cTn id="27" dur="1250"/>
+                                        <p:tgtEl>
+                                          <p:spTgt spid="28"/>
+                                        </p:tgtEl>
+                                      </p:cBhvr>
+                                    </p:animEffect>
+                                  </p:childTnLst>
+                                </p:cTn>
+                              </p:par>
+                              <p:par>
+                                <p:cTn id="28" presetID="1" presetClass="emph" presetSubtype="2" fill="hold" nodeType="withEffect">
+                                  <p:stCondLst>
+                                    <p:cond delay="400"/>
+                                  </p:stCondLst>
+                                  <p:childTnLst>
+                                    <p:animClr clrSpc="rgb" dir="cw">
+                                      <p:cBhvr>
+                                        <p:cTn id="29" dur="2000" fill="hold"/>
+                                        <p:tgtEl>
+                                          <p:spTgt spid="28"/>
+                                        </p:tgtEl>
+                                        <p:attrNameLst>
+                                          <p:attrName>fillcolor</p:attrName>
+                                        </p:attrNameLst>
+                                      </p:cBhvr>
+                                      <p:to>
+                                        <a:srgbClr val="002060"/>
+                                      </p:to>
+                                    </p:animClr>
+                                    <p:set>
+                                      <p:cBhvr>
+                                        <p:cTn id="30" dur="2000" fill="hold"/>
+                                        <p:tgtEl>
+                                          <p:spTgt spid="28"/>
+                                        </p:tgtEl>
+                                        <p:attrNameLst>
+                                          <p:attrName>fill.type</p:attrName>
+                                        </p:attrNameLst>
+                                      </p:cBhvr>
+                                      <p:to>
+                                        <p:strVal val="solid"/>
+                                      </p:to>
+                                    </p:set>
+                                    <p:set>
+                                      <p:cBhvr>
+                                        <p:cTn id="31" dur="2000" fill="hold"/>
+                                        <p:tgtEl>
+                                          <p:spTgt spid="28"/>
+                                        </p:tgtEl>
+                                        <p:attrNameLst>
+                                          <p:attrName>fill.on</p:attrName>
+                                        </p:attrNameLst>
+                                      </p:cBhvr>
+                                      <p:to>
+                                        <p:strVal val="true"/>
+                                      </p:to>
+                                    </p:set>
+                                  </p:childTnLst>
+                                </p:cTn>
+                              </p:par>
+                            </p:childTnLst>
+                          </p:cTn>
+                        </p:par>
+                      </p:childTnLst>
+                    </p:cTn>
+                  </p:par>
+                </p:childTnLst>
+              </p:cTn>
+              <p:nextCondLst>
+                <p:cond evt="onClick" delay="0">
+                  <p:tgtEl>
+                    <p:spTgt spid="19"/>
+                  </p:tgtEl>
+                </p:cond>
+              </p:nextCondLst>
+            </p:seq>
+          </p:childTnLst>
+        </p:cTn>
+      </p:par>
+    </p:tnLst>
+    <p:bldLst>
+      <p:bldP spid="26" grpId="0" animBg="1"/>
+      <p:bldP spid="27" grpId="0" animBg="1"/>
+      <p:bldP spid="28" grpId="0" animBg="1"/>
+    </p:bldLst>
+  </p:timing>
 </p:sld>
 </file>
 
@@ -7424,10 +8210,10 @@
       </p:grpSpPr>
       <p:pic>
         <p:nvPicPr>
-          <p:cNvPr id="5" name="Picture 4" descr="A white hexagons with blue edges&#10;&#10;Description automatically generated">
-            <a:extLst>
-              <a:ext uri="{FF2B5EF4-FFF2-40B4-BE49-F238E27FC236}">
-                <a16:creationId xmlns:a16="http://schemas.microsoft.com/office/drawing/2014/main" id="{7F5FD30C-87C3-EF60-E0BE-F08CB3181E67}"/>
+          <p:cNvPr id="3" name="Picture 2" descr="A white hexagons with blue edges&#10;&#10;Description automatically generated">
+            <a:extLst>
+              <a:ext uri="{FF2B5EF4-FFF2-40B4-BE49-F238E27FC236}">
+                <a16:creationId xmlns:a16="http://schemas.microsoft.com/office/drawing/2014/main" id="{B2F1C530-16E9-7FB6-B8D3-BB3A8650EEC8}"/>
               </a:ext>
             </a:extLst>
           </p:cNvPr>
@@ -7486,7 +8272,7 @@
           </a:solidFill>
           <a:ln>
             <a:solidFill>
-              <a:srgbClr val="002060"/>
+              <a:srgbClr val="0056AE"/>
             </a:solidFill>
           </a:ln>
         </p:spPr>
@@ -7540,6 +8326,328 @@
               <a:rPr lang="en-GB" smtClean="0"/>
               <a:pPr/>
               <a:t>12</a:t>
+            </a:fld>
+            <a:endParaRPr lang="en-GB" dirty="0"/>
+          </a:p>
+        </p:txBody>
+      </p:sp>
+      <p:sp>
+        <p:nvSpPr>
+          <p:cNvPr id="9" name="Text Placeholder 9">
+            <a:extLst>
+              <a:ext uri="{FF2B5EF4-FFF2-40B4-BE49-F238E27FC236}">
+                <a16:creationId xmlns:a16="http://schemas.microsoft.com/office/drawing/2014/main" id="{302E7C59-D305-5F46-C4DF-DEF02469E3CC}"/>
+              </a:ext>
+            </a:extLst>
+          </p:cNvPr>
+          <p:cNvSpPr>
+            <a:spLocks noGrp="1"/>
+          </p:cNvSpPr>
+          <p:nvPr>
+            <p:ph type="body" sz="quarter" idx="19"/>
+          </p:nvPr>
+        </p:nvSpPr>
+        <p:spPr>
+          <a:xfrm>
+            <a:off x="460865" y="6420548"/>
+            <a:ext cx="6312900" cy="244800"/>
+          </a:xfrm>
+        </p:spPr>
+        <p:txBody>
+          <a:bodyPr/>
+          <a:lstStyle/>
+          <a:p>
+            <a:r>
+              <a:rPr lang="en-ZA" dirty="0">
+                <a:latin typeface="Helvetica" panose="020B0604020202020204" pitchFamily="34" charset="0"/>
+                <a:cs typeface="Helvetica" panose="020B0604020202020204" pitchFamily="34" charset="0"/>
+              </a:rPr>
+              <a:t>Data Led: Intelligent Insights</a:t>
+            </a:r>
+          </a:p>
+        </p:txBody>
+      </p:sp>
+      <p:sp>
+        <p:nvSpPr>
+          <p:cNvPr id="7" name="TextBox 6">
+            <a:extLst>
+              <a:ext uri="{FF2B5EF4-FFF2-40B4-BE49-F238E27FC236}">
+                <a16:creationId xmlns:a16="http://schemas.microsoft.com/office/drawing/2014/main" id="{5DA691A9-2FC5-5070-CAD2-884AD82BEF6F}"/>
+              </a:ext>
+            </a:extLst>
+          </p:cNvPr>
+          <p:cNvSpPr txBox="1"/>
+          <p:nvPr/>
+        </p:nvSpPr>
+        <p:spPr>
+          <a:xfrm>
+            <a:off x="460865" y="4981897"/>
+            <a:ext cx="7470784" cy="553998"/>
+          </a:xfrm>
+          <a:prstGeom prst="rect">
+            <a:avLst/>
+          </a:prstGeom>
+          <a:noFill/>
+        </p:spPr>
+        <p:txBody>
+          <a:bodyPr wrap="square" lIns="0" tIns="0" rIns="0" bIns="0" rtlCol="0">
+            <a:spAutoFit/>
+          </a:bodyPr>
+          <a:lstStyle/>
+          <a:p>
+            <a:pPr algn="l">
+              <a:spcAft>
+                <a:spcPts val="600"/>
+              </a:spcAft>
+            </a:pPr>
+            <a:r>
+              <a:rPr lang="en-US" sz="3600" dirty="0">
+                <a:solidFill>
+                  <a:schemeClr val="bg1"/>
+                </a:solidFill>
+              </a:rPr>
+              <a:t>BIOps Demo</a:t>
+            </a:r>
+            <a:endParaRPr lang="en-ZA" sz="3600" dirty="0">
+              <a:solidFill>
+                <a:schemeClr val="bg1"/>
+              </a:solidFill>
+            </a:endParaRPr>
+          </a:p>
+        </p:txBody>
+      </p:sp>
+      <p:pic>
+        <p:nvPicPr>
+          <p:cNvPr id="5" name="Picture 4" descr="A logo on a black background&#10;&#10;Description automatically generated">
+            <a:extLst>
+              <a:ext uri="{FF2B5EF4-FFF2-40B4-BE49-F238E27FC236}">
+                <a16:creationId xmlns:a16="http://schemas.microsoft.com/office/drawing/2014/main" id="{9F3E140F-F3D0-01D6-801E-82611693B129}"/>
+              </a:ext>
+            </a:extLst>
+          </p:cNvPr>
+          <p:cNvPicPr>
+            <a:picLocks noChangeAspect="1"/>
+          </p:cNvPicPr>
+          <p:nvPr/>
+        </p:nvPicPr>
+        <p:blipFill rotWithShape="1">
+          <a:blip r:embed="rId3" cstate="email">
+            <a:extLst>
+              <a:ext uri="{28A0092B-C50C-407E-A947-70E740481C1C}">
+                <a14:useLocalDpi xmlns:a14="http://schemas.microsoft.com/office/drawing/2010/main"/>
+              </a:ext>
+            </a:extLst>
+          </a:blip>
+          <a:srcRect/>
+          <a:stretch/>
+        </p:blipFill>
+        <p:spPr>
+          <a:xfrm>
+            <a:off x="9409427" y="5820717"/>
+            <a:ext cx="2321708" cy="722231"/>
+          </a:xfrm>
+          <a:prstGeom prst="rect">
+            <a:avLst/>
+          </a:prstGeom>
+        </p:spPr>
+      </p:pic>
+      <p:sp>
+        <p:nvSpPr>
+          <p:cNvPr id="4" name="TextBox 3">
+            <a:extLst>
+              <a:ext uri="{FF2B5EF4-FFF2-40B4-BE49-F238E27FC236}">
+                <a16:creationId xmlns:a16="http://schemas.microsoft.com/office/drawing/2014/main" id="{79E86465-4476-47FD-A061-C5452DCA3B73}"/>
+              </a:ext>
+            </a:extLst>
+          </p:cNvPr>
+          <p:cNvSpPr txBox="1"/>
+          <p:nvPr/>
+        </p:nvSpPr>
+        <p:spPr>
+          <a:xfrm>
+            <a:off x="460865" y="5535895"/>
+            <a:ext cx="6731045" cy="430887"/>
+          </a:xfrm>
+          <a:prstGeom prst="rect">
+            <a:avLst/>
+          </a:prstGeom>
+          <a:noFill/>
+        </p:spPr>
+        <p:txBody>
+          <a:bodyPr wrap="square" lIns="0" tIns="0" rIns="0" bIns="0" rtlCol="0">
+            <a:spAutoFit/>
+          </a:bodyPr>
+          <a:lstStyle/>
+          <a:p>
+            <a:pPr algn="l">
+              <a:spcAft>
+                <a:spcPts val="600"/>
+              </a:spcAft>
+            </a:pPr>
+            <a:r>
+              <a:rPr lang="en-US" sz="2800" dirty="0">
+                <a:solidFill>
+                  <a:schemeClr val="bg1"/>
+                </a:solidFill>
+              </a:rPr>
+              <a:t>By Chosen Ones Graduate Team</a:t>
+            </a:r>
+            <a:endParaRPr lang="en-ZA" sz="2800" dirty="0" err="1">
+              <a:solidFill>
+                <a:schemeClr val="bg1"/>
+              </a:solidFill>
+            </a:endParaRPr>
+          </a:p>
+        </p:txBody>
+      </p:sp>
+    </p:spTree>
+    <p:extLst>
+      <p:ext uri="{BB962C8B-B14F-4D97-AF65-F5344CB8AC3E}">
+        <p14:creationId xmlns:p14="http://schemas.microsoft.com/office/powerpoint/2010/main" val="878242559"/>
+      </p:ext>
+    </p:extLst>
+  </p:cSld>
+  <p:clrMapOvr>
+    <a:masterClrMapping/>
+  </p:clrMapOvr>
+</p:sld>
+</file>
+
+<file path=ppt/slides/slide13.xml><?xml version="1.0" encoding="utf-8"?>
+<p:sld xmlns:a="http://schemas.openxmlformats.org/drawingml/2006/main" xmlns:r="http://schemas.openxmlformats.org/officeDocument/2006/relationships" xmlns:p="http://schemas.openxmlformats.org/presentationml/2006/main">
+  <p:cSld>
+    <p:spTree>
+      <p:nvGrpSpPr>
+        <p:cNvPr id="1" name=""/>
+        <p:cNvGrpSpPr/>
+        <p:nvPr/>
+      </p:nvGrpSpPr>
+      <p:grpSpPr>
+        <a:xfrm>
+          <a:off x="0" y="0"/>
+          <a:ext cx="0" cy="0"/>
+          <a:chOff x="0" y="0"/>
+          <a:chExt cx="0" cy="0"/>
+        </a:xfrm>
+      </p:grpSpPr>
+      <p:pic>
+        <p:nvPicPr>
+          <p:cNvPr id="5" name="Picture 4" descr="A white hexagons with blue edges&#10;&#10;Description automatically generated">
+            <a:extLst>
+              <a:ext uri="{FF2B5EF4-FFF2-40B4-BE49-F238E27FC236}">
+                <a16:creationId xmlns:a16="http://schemas.microsoft.com/office/drawing/2014/main" id="{7F5FD30C-87C3-EF60-E0BE-F08CB3181E67}"/>
+              </a:ext>
+            </a:extLst>
+          </p:cNvPr>
+          <p:cNvPicPr>
+            <a:picLocks noChangeAspect="1"/>
+          </p:cNvPicPr>
+          <p:nvPr/>
+        </p:nvPicPr>
+        <p:blipFill>
+          <a:blip r:embed="rId2" cstate="email">
+            <a:alphaModFix amt="35000"/>
+            <a:extLst>
+              <a:ext uri="{28A0092B-C50C-407E-A947-70E740481C1C}">
+                <a14:useLocalDpi xmlns:a14="http://schemas.microsoft.com/office/drawing/2010/main"/>
+              </a:ext>
+            </a:extLst>
+          </a:blip>
+          <a:stretch>
+            <a:fillRect/>
+          </a:stretch>
+        </p:blipFill>
+        <p:spPr>
+          <a:xfrm>
+            <a:off x="0" y="0"/>
+            <a:ext cx="12192000" cy="6858000"/>
+          </a:xfrm>
+          <a:prstGeom prst="rect">
+            <a:avLst/>
+          </a:prstGeom>
+        </p:spPr>
+      </p:pic>
+      <p:sp>
+        <p:nvSpPr>
+          <p:cNvPr id="21" name="Isosceles Triangle 20">
+            <a:extLst>
+              <a:ext uri="{FF2B5EF4-FFF2-40B4-BE49-F238E27FC236}">
+                <a16:creationId xmlns:a16="http://schemas.microsoft.com/office/drawing/2014/main" id="{27015457-004D-ED7D-3B53-4C917E9BF5CA}"/>
+              </a:ext>
+            </a:extLst>
+          </p:cNvPr>
+          <p:cNvSpPr/>
+          <p:nvPr/>
+        </p:nvSpPr>
+        <p:spPr>
+          <a:xfrm>
+            <a:off x="0" y="0"/>
+            <a:ext cx="9615377" cy="6858000"/>
+          </a:xfrm>
+          <a:prstGeom prst="triangle">
+            <a:avLst>
+              <a:gd name="adj" fmla="val 0"/>
+            </a:avLst>
+          </a:prstGeom>
+          <a:solidFill>
+            <a:srgbClr val="0056AE"/>
+          </a:solidFill>
+          <a:ln>
+            <a:solidFill>
+              <a:srgbClr val="002060"/>
+            </a:solidFill>
+          </a:ln>
+        </p:spPr>
+        <p:style>
+          <a:lnRef idx="2">
+            <a:schemeClr val="accent1">
+              <a:shade val="50000"/>
+            </a:schemeClr>
+          </a:lnRef>
+          <a:fillRef idx="1">
+            <a:schemeClr val="accent1"/>
+          </a:fillRef>
+          <a:effectRef idx="0">
+            <a:schemeClr val="accent1"/>
+          </a:effectRef>
+          <a:fontRef idx="minor">
+            <a:schemeClr val="lt1"/>
+          </a:fontRef>
+        </p:style>
+        <p:txBody>
+          <a:bodyPr lIns="72000" tIns="36000" rIns="72000" bIns="36000" rtlCol="0" anchor="ctr"/>
+          <a:lstStyle/>
+          <a:p>
+            <a:pPr algn="ctr"/>
+            <a:endParaRPr lang="en-ZA" sz="1400" noProof="0" dirty="0" err="1"/>
+          </a:p>
+        </p:txBody>
+      </p:sp>
+      <p:sp>
+        <p:nvSpPr>
+          <p:cNvPr id="2" name="Slide Number Placeholder 1">
+            <a:extLst>
+              <a:ext uri="{FF2B5EF4-FFF2-40B4-BE49-F238E27FC236}">
+                <a16:creationId xmlns:a16="http://schemas.microsoft.com/office/drawing/2014/main" id="{759C60B5-1358-D026-FF38-8DBBACD47019}"/>
+              </a:ext>
+            </a:extLst>
+          </p:cNvPr>
+          <p:cNvSpPr>
+            <a:spLocks noGrp="1"/>
+          </p:cNvSpPr>
+          <p:nvPr>
+            <p:ph type="sldNum" sz="quarter" idx="17"/>
+          </p:nvPr>
+        </p:nvSpPr>
+        <p:spPr/>
+        <p:txBody>
+          <a:bodyPr/>
+          <a:lstStyle/>
+          <a:p>
+            <a:fld id="{23AA811B-2EBD-4900-905E-5BE206449611}" type="slidenum">
+              <a:rPr lang="en-GB" smtClean="0"/>
+              <a:pPr/>
+              <a:t>13</a:t>
             </a:fld>
             <a:endParaRPr lang="en-GB" dirty="0"/>
           </a:p>
@@ -16223,6 +17331,15 @@
 </file>
 
 <file path=customXml/item1.xml><?xml version="1.0" encoding="utf-8"?>
+<?mso-contentType ?>
+<FormTemplates xmlns="http://schemas.microsoft.com/sharepoint/v3/contenttype/forms">
+  <Display>DocumentLibraryForm</Display>
+  <Edit>DocumentLibraryForm</Edit>
+  <New>DocumentLibraryForm</New>
+</FormTemplates>
+</file>
+
+<file path=customXml/item2.xml><?xml version="1.0" encoding="utf-8"?>
 <ct:contentTypeSchema xmlns:ct="http://schemas.microsoft.com/office/2006/metadata/contentType" xmlns:ma="http://schemas.microsoft.com/office/2006/metadata/properties/metaAttributes" ct:_="" ma:_="" ma:contentTypeName="Document" ma:contentTypeID="0x010100F132B9D669F4EC4BAB1D5C90AACD7F14" ma:contentTypeVersion="14" ma:contentTypeDescription="Create a new document." ma:contentTypeScope="" ma:versionID="4caf2f1c01fd27045a37f09237b1c7f5">
   <xsd:schema xmlns:xsd="http://www.w3.org/2001/XMLSchema" xmlns:xs="http://www.w3.org/2001/XMLSchema" xmlns:p="http://schemas.microsoft.com/office/2006/metadata/properties" xmlns:ns3="fec3b462-023f-4d5d-916e-ea1f58025ed9" xmlns:ns4="c820ed94-89e5-4068-a496-b05f100dec8e" targetNamespace="http://schemas.microsoft.com/office/2006/metadata/properties" ma:root="true" ma:fieldsID="bd2f0e76fdbd748911d9a962320caf88" ns3:_="" ns4:_="">
     <xsd:import namespace="fec3b462-023f-4d5d-916e-ea1f58025ed9"/>
@@ -16449,15 +17566,6 @@
 </ct:contentTypeSchema>
 </file>
 
-<file path=customXml/item2.xml><?xml version="1.0" encoding="utf-8"?>
-<?mso-contentType ?>
-<FormTemplates xmlns="http://schemas.microsoft.com/sharepoint/v3/contenttype/forms">
-  <Display>DocumentLibraryForm</Display>
-  <Edit>DocumentLibraryForm</Edit>
-  <New>DocumentLibraryForm</New>
-</FormTemplates>
-</file>
-
 <file path=customXml/item3.xml><?xml version="1.0" encoding="utf-8"?>
 <p:properties xmlns:p="http://schemas.microsoft.com/office/2006/metadata/properties" xmlns:xsi="http://www.w3.org/2001/XMLSchema-instance" xmlns:pc="http://schemas.microsoft.com/office/infopath/2007/PartnerControls">
   <documentManagement>
@@ -16467,6 +17575,14 @@
 </file>
 
 <file path=customXml/itemProps1.xml><?xml version="1.0" encoding="utf-8"?>
+<ds:datastoreItem xmlns:ds="http://schemas.openxmlformats.org/officeDocument/2006/customXml" ds:itemID="{726ECC11-8EF4-42B8-B9B7-B13B86BFFAF6}">
+  <ds:schemaRefs>
+    <ds:schemaRef ds:uri="http://schemas.microsoft.com/sharepoint/v3/contenttype/forms"/>
+  </ds:schemaRefs>
+</ds:datastoreItem>
+</file>
+
+<file path=customXml/itemProps2.xml><?xml version="1.0" encoding="utf-8"?>
 <ds:datastoreItem xmlns:ds="http://schemas.openxmlformats.org/officeDocument/2006/customXml" ds:itemID="{3E27DA02-E4CF-46D8-9B8D-27F2DD1EF37A}">
   <ds:schemaRefs>
     <ds:schemaRef ds:uri="http://schemas.microsoft.com/office/2006/metadata/contentType"/>
@@ -16481,14 +17597,6 @@
     <ds:schemaRef ds:uri="http://purl.org/dc/elements/1.1/"/>
     <ds:schemaRef ds:uri="http://purl.org/dc/terms/"/>
     <ds:schemaRef ds:uri="http://schemas.microsoft.com/internal/obd"/>
-  </ds:schemaRefs>
-</ds:datastoreItem>
-</file>
-
-<file path=customXml/itemProps2.xml><?xml version="1.0" encoding="utf-8"?>
-<ds:datastoreItem xmlns:ds="http://schemas.openxmlformats.org/officeDocument/2006/customXml" ds:itemID="{726ECC11-8EF4-42B8-B9B7-B13B86BFFAF6}">
-  <ds:schemaRefs>
-    <ds:schemaRef ds:uri="http://schemas.microsoft.com/sharepoint/v3/contenttype/forms"/>
   </ds:schemaRefs>
 </ds:datastoreItem>
 </file>

</xml_diff>